<commit_message>
Gear fault simulink works
Discrete model is developed. Fault is simulated.
</commit_message>
<xml_diff>
--- a/Parameter Estimation Works/Embedded coder Paper/IEEETransactions_Word/Figures_embedded coder paper.pptx
+++ b/Parameter Estimation Works/Embedded coder Paper/IEEETransactions_Word/Figures_embedded coder paper.pptx
@@ -7,6 +7,7 @@
   <p:sldIdLst>
     <p:sldId id="256" r:id="rId2"/>
     <p:sldId id="257" r:id="rId3"/>
+    <p:sldId id="258" r:id="rId4"/>
   </p:sldIdLst>
   <p:sldSz cx="9144000" cy="6858000" type="screen4x3"/>
   <p:notesSz cx="6858000" cy="9144000"/>
@@ -290,7 +291,7 @@
             <a:fld id="{D9F75050-0E15-4C5B-92B0-66D068882F1F}" type="datetimeFigureOut">
               <a:rPr lang="tr-TR" smtClean="0"/>
               <a:pPr/>
-              <a:t>23.12.2020</a:t>
+              <a:t>04.01.2021</a:t>
             </a:fld>
             <a:endParaRPr lang="tr-TR"/>
           </a:p>
@@ -457,7 +458,7 @@
             <a:fld id="{D9F75050-0E15-4C5B-92B0-66D068882F1F}" type="datetimeFigureOut">
               <a:rPr lang="tr-TR" smtClean="0"/>
               <a:pPr/>
-              <a:t>23.12.2020</a:t>
+              <a:t>04.01.2021</a:t>
             </a:fld>
             <a:endParaRPr lang="tr-TR"/>
           </a:p>
@@ -634,7 +635,7 @@
             <a:fld id="{D9F75050-0E15-4C5B-92B0-66D068882F1F}" type="datetimeFigureOut">
               <a:rPr lang="tr-TR" smtClean="0"/>
               <a:pPr/>
-              <a:t>23.12.2020</a:t>
+              <a:t>04.01.2021</a:t>
             </a:fld>
             <a:endParaRPr lang="tr-TR"/>
           </a:p>
@@ -801,7 +802,7 @@
             <a:fld id="{D9F75050-0E15-4C5B-92B0-66D068882F1F}" type="datetimeFigureOut">
               <a:rPr lang="tr-TR" smtClean="0"/>
               <a:pPr/>
-              <a:t>23.12.2020</a:t>
+              <a:t>04.01.2021</a:t>
             </a:fld>
             <a:endParaRPr lang="tr-TR"/>
           </a:p>
@@ -1044,7 +1045,7 @@
             <a:fld id="{D9F75050-0E15-4C5B-92B0-66D068882F1F}" type="datetimeFigureOut">
               <a:rPr lang="tr-TR" smtClean="0"/>
               <a:pPr/>
-              <a:t>23.12.2020</a:t>
+              <a:t>04.01.2021</a:t>
             </a:fld>
             <a:endParaRPr lang="tr-TR"/>
           </a:p>
@@ -1329,7 +1330,7 @@
             <a:fld id="{D9F75050-0E15-4C5B-92B0-66D068882F1F}" type="datetimeFigureOut">
               <a:rPr lang="tr-TR" smtClean="0"/>
               <a:pPr/>
-              <a:t>23.12.2020</a:t>
+              <a:t>04.01.2021</a:t>
             </a:fld>
             <a:endParaRPr lang="tr-TR"/>
           </a:p>
@@ -1748,7 +1749,7 @@
             <a:fld id="{D9F75050-0E15-4C5B-92B0-66D068882F1F}" type="datetimeFigureOut">
               <a:rPr lang="tr-TR" smtClean="0"/>
               <a:pPr/>
-              <a:t>23.12.2020</a:t>
+              <a:t>04.01.2021</a:t>
             </a:fld>
             <a:endParaRPr lang="tr-TR"/>
           </a:p>
@@ -1863,7 +1864,7 @@
             <a:fld id="{D9F75050-0E15-4C5B-92B0-66D068882F1F}" type="datetimeFigureOut">
               <a:rPr lang="tr-TR" smtClean="0"/>
               <a:pPr/>
-              <a:t>23.12.2020</a:t>
+              <a:t>04.01.2021</a:t>
             </a:fld>
             <a:endParaRPr lang="tr-TR"/>
           </a:p>
@@ -1955,7 +1956,7 @@
             <a:fld id="{D9F75050-0E15-4C5B-92B0-66D068882F1F}" type="datetimeFigureOut">
               <a:rPr lang="tr-TR" smtClean="0"/>
               <a:pPr/>
-              <a:t>23.12.2020</a:t>
+              <a:t>04.01.2021</a:t>
             </a:fld>
             <a:endParaRPr lang="tr-TR"/>
           </a:p>
@@ -2229,7 +2230,7 @@
             <a:fld id="{D9F75050-0E15-4C5B-92B0-66D068882F1F}" type="datetimeFigureOut">
               <a:rPr lang="tr-TR" smtClean="0"/>
               <a:pPr/>
-              <a:t>23.12.2020</a:t>
+              <a:t>04.01.2021</a:t>
             </a:fld>
             <a:endParaRPr lang="tr-TR"/>
           </a:p>
@@ -2479,7 +2480,7 @@
             <a:fld id="{D9F75050-0E15-4C5B-92B0-66D068882F1F}" type="datetimeFigureOut">
               <a:rPr lang="tr-TR" smtClean="0"/>
               <a:pPr/>
-              <a:t>23.12.2020</a:t>
+              <a:t>04.01.2021</a:t>
             </a:fld>
             <a:endParaRPr lang="tr-TR"/>
           </a:p>
@@ -2689,7 +2690,7 @@
             <a:fld id="{D9F75050-0E15-4C5B-92B0-66D068882F1F}" type="datetimeFigureOut">
               <a:rPr lang="tr-TR" smtClean="0"/>
               <a:pPr/>
-              <a:t>23.12.2020</a:t>
+              <a:t>04.01.2021</a:t>
             </a:fld>
             <a:endParaRPr lang="tr-TR"/>
           </a:p>
@@ -3647,6 +3648,458 @@
 </p:sld>
 </file>
 
+<file path=ppt/slides/slide3.xml><?xml version="1.0" encoding="utf-8"?>
+<p:sld xmlns:a="http://schemas.openxmlformats.org/drawingml/2006/main" xmlns:r="http://schemas.openxmlformats.org/officeDocument/2006/relationships" xmlns:p="http://schemas.openxmlformats.org/presentationml/2006/main">
+  <p:cSld>
+    <p:spTree>
+      <p:nvGrpSpPr>
+        <p:cNvPr id="1" name=""/>
+        <p:cNvGrpSpPr/>
+        <p:nvPr/>
+      </p:nvGrpSpPr>
+      <p:grpSpPr>
+        <a:xfrm>
+          <a:off x="0" y="0"/>
+          <a:ext cx="0" cy="0"/>
+          <a:chOff x="0" y="0"/>
+          <a:chExt cx="0" cy="0"/>
+        </a:xfrm>
+      </p:grpSpPr>
+      <p:sp>
+        <p:nvSpPr>
+          <p:cNvPr id="4" name="3 Metin kutusu"/>
+          <p:cNvSpPr txBox="1"/>
+          <p:nvPr/>
+        </p:nvSpPr>
+        <p:spPr>
+          <a:xfrm>
+            <a:off x="1187624" y="1124744"/>
+            <a:ext cx="1062407" cy="461665"/>
+          </a:xfrm>
+          <a:prstGeom prst="rect">
+            <a:avLst/>
+          </a:prstGeom>
+          <a:noFill/>
+          <a:ln>
+            <a:solidFill>
+              <a:schemeClr val="tx1"/>
+            </a:solidFill>
+          </a:ln>
+        </p:spPr>
+        <p:txBody>
+          <a:bodyPr wrap="none" rtlCol="0">
+            <a:spAutoFit/>
+          </a:bodyPr>
+          <a:lstStyle/>
+          <a:p>
+            <a:pPr algn="ctr"/>
+            <a:r>
+              <a:rPr lang="en-US" sz="1200" b="1" dirty="0" smtClean="0"/>
+              <a:t>Design </a:t>
+            </a:r>
+            <a:endParaRPr lang="tr-TR" sz="1200" b="1" dirty="0" smtClean="0"/>
+          </a:p>
+          <a:p>
+            <a:pPr algn="ctr"/>
+            <a:r>
+              <a:rPr lang="en-US" sz="1200" b="1" dirty="0" smtClean="0"/>
+              <a:t>Specifications</a:t>
+            </a:r>
+            <a:endParaRPr lang="en-US" sz="1200" b="1" dirty="0"/>
+          </a:p>
+        </p:txBody>
+      </p:sp>
+      <p:sp>
+        <p:nvSpPr>
+          <p:cNvPr id="5" name="4 Metin kutusu"/>
+          <p:cNvSpPr txBox="1"/>
+          <p:nvPr/>
+        </p:nvSpPr>
+        <p:spPr>
+          <a:xfrm>
+            <a:off x="2487145" y="1124744"/>
+            <a:ext cx="1078565" cy="830997"/>
+          </a:xfrm>
+          <a:prstGeom prst="rect">
+            <a:avLst/>
+          </a:prstGeom>
+          <a:noFill/>
+          <a:ln>
+            <a:solidFill>
+              <a:schemeClr val="tx1"/>
+            </a:solidFill>
+          </a:ln>
+        </p:spPr>
+        <p:txBody>
+          <a:bodyPr wrap="none" rtlCol="0">
+            <a:spAutoFit/>
+          </a:bodyPr>
+          <a:lstStyle/>
+          <a:p>
+            <a:pPr algn="ctr"/>
+            <a:r>
+              <a:rPr lang="en-US" sz="1200" b="1" dirty="0" smtClean="0"/>
+              <a:t>Requirements</a:t>
+            </a:r>
+            <a:endParaRPr lang="tr-TR" sz="1200" b="1" dirty="0" smtClean="0"/>
+          </a:p>
+          <a:p>
+            <a:pPr algn="ctr"/>
+            <a:r>
+              <a:rPr lang="tr-TR" sz="1200" dirty="0" smtClean="0"/>
+              <a:t>Hardware</a:t>
+            </a:r>
+          </a:p>
+          <a:p>
+            <a:pPr algn="ctr"/>
+            <a:r>
+              <a:rPr lang="tr-TR" sz="1200" dirty="0" smtClean="0"/>
+              <a:t>+</a:t>
+            </a:r>
+            <a:endParaRPr lang="tr-TR" sz="1200" dirty="0" smtClean="0"/>
+          </a:p>
+          <a:p>
+            <a:pPr algn="ctr"/>
+            <a:r>
+              <a:rPr lang="tr-TR" sz="1200" dirty="0" smtClean="0"/>
+              <a:t>Software</a:t>
+            </a:r>
+            <a:endParaRPr lang="en-US" sz="1200" dirty="0"/>
+          </a:p>
+        </p:txBody>
+      </p:sp>
+      <p:sp>
+        <p:nvSpPr>
+          <p:cNvPr id="6" name="5 Metin kutusu"/>
+          <p:cNvSpPr txBox="1"/>
+          <p:nvPr/>
+        </p:nvSpPr>
+        <p:spPr>
+          <a:xfrm>
+            <a:off x="3802824" y="1124744"/>
+            <a:ext cx="1536253" cy="1200329"/>
+          </a:xfrm>
+          <a:prstGeom prst="rect">
+            <a:avLst/>
+          </a:prstGeom>
+          <a:noFill/>
+          <a:ln>
+            <a:solidFill>
+              <a:schemeClr val="tx1"/>
+            </a:solidFill>
+          </a:ln>
+        </p:spPr>
+        <p:txBody>
+          <a:bodyPr wrap="none" rtlCol="0">
+            <a:spAutoFit/>
+          </a:bodyPr>
+          <a:lstStyle/>
+          <a:p>
+            <a:pPr algn="ctr"/>
+            <a:r>
+              <a:rPr lang="en-US" sz="1200" b="1" dirty="0" smtClean="0"/>
+              <a:t>Analysis</a:t>
+            </a:r>
+          </a:p>
+          <a:p>
+            <a:pPr algn="ctr"/>
+            <a:r>
+              <a:rPr lang="en-US" sz="1200" dirty="0" smtClean="0"/>
+              <a:t>Model of Real System</a:t>
+            </a:r>
+          </a:p>
+          <a:p>
+            <a:pPr algn="ctr"/>
+            <a:r>
+              <a:rPr lang="en-US" sz="1200" dirty="0" smtClean="0"/>
+              <a:t>Sub</a:t>
+            </a:r>
+            <a:r>
+              <a:rPr lang="tr-TR" sz="1200" dirty="0" smtClean="0"/>
+              <a:t>-</a:t>
+            </a:r>
+            <a:r>
+              <a:rPr lang="en-US" sz="1200" dirty="0" smtClean="0"/>
+              <a:t>models</a:t>
+            </a:r>
+            <a:endParaRPr lang="tr-TR" sz="1200" dirty="0" smtClean="0"/>
+          </a:p>
+          <a:p>
+            <a:pPr algn="ctr"/>
+            <a:r>
+              <a:rPr lang="en-US" sz="1200" dirty="0" smtClean="0"/>
+              <a:t>Closed loops specs.</a:t>
+            </a:r>
+          </a:p>
+          <a:p>
+            <a:pPr algn="ctr"/>
+            <a:r>
+              <a:rPr lang="en-US" sz="1200" dirty="0" smtClean="0"/>
+              <a:t>Functions</a:t>
+            </a:r>
+          </a:p>
+          <a:p>
+            <a:pPr algn="ctr"/>
+            <a:r>
+              <a:rPr lang="en-US" sz="1200" dirty="0" smtClean="0"/>
+              <a:t>State</a:t>
+            </a:r>
+            <a:r>
+              <a:rPr lang="tr-TR" sz="1200" dirty="0" smtClean="0"/>
+              <a:t> </a:t>
+            </a:r>
+            <a:r>
+              <a:rPr lang="en-US" sz="1200" dirty="0" smtClean="0"/>
+              <a:t>flow</a:t>
+            </a:r>
+          </a:p>
+        </p:txBody>
+      </p:sp>
+      <p:sp>
+        <p:nvSpPr>
+          <p:cNvPr id="7" name="6 Metin kutusu"/>
+          <p:cNvSpPr txBox="1"/>
+          <p:nvPr/>
+        </p:nvSpPr>
+        <p:spPr>
+          <a:xfrm>
+            <a:off x="5586735" y="1124744"/>
+            <a:ext cx="1217513" cy="830997"/>
+          </a:xfrm>
+          <a:prstGeom prst="rect">
+            <a:avLst/>
+          </a:prstGeom>
+          <a:noFill/>
+          <a:ln>
+            <a:solidFill>
+              <a:schemeClr val="tx1"/>
+            </a:solidFill>
+          </a:ln>
+        </p:spPr>
+        <p:txBody>
+          <a:bodyPr wrap="none" rtlCol="0">
+            <a:spAutoFit/>
+          </a:bodyPr>
+          <a:lstStyle/>
+          <a:p>
+            <a:pPr algn="ctr"/>
+            <a:r>
+              <a:rPr lang="en-US" sz="1200" b="1" dirty="0" smtClean="0"/>
+              <a:t>Implementation</a:t>
+            </a:r>
+          </a:p>
+          <a:p>
+            <a:pPr algn="ctr"/>
+            <a:r>
+              <a:rPr lang="en-US" sz="1200" dirty="0" smtClean="0"/>
+              <a:t>SIL + HIL</a:t>
+            </a:r>
+          </a:p>
+          <a:p>
+            <a:pPr algn="ctr"/>
+            <a:r>
+              <a:rPr lang="en-US" sz="1200" dirty="0" smtClean="0"/>
+              <a:t>Test </a:t>
+            </a:r>
+            <a:endParaRPr lang="tr-TR" sz="1200" dirty="0" smtClean="0"/>
+          </a:p>
+          <a:p>
+            <a:pPr algn="ctr"/>
+            <a:r>
+              <a:rPr lang="en-US" sz="1200" dirty="0" smtClean="0"/>
+              <a:t>Verification</a:t>
+            </a:r>
+            <a:endParaRPr lang="tr-TR" sz="1200" dirty="0" smtClean="0"/>
+          </a:p>
+        </p:txBody>
+      </p:sp>
+      <p:cxnSp>
+        <p:nvCxnSpPr>
+          <p:cNvPr id="9" name="8 Düz Ok Bağlayıcısı"/>
+          <p:cNvCxnSpPr/>
+          <p:nvPr/>
+        </p:nvCxnSpPr>
+        <p:spPr>
+          <a:xfrm>
+            <a:off x="2260576" y="1340768"/>
+            <a:ext cx="216024" cy="0"/>
+          </a:xfrm>
+          <a:prstGeom prst="straightConnector1">
+            <a:avLst/>
+          </a:prstGeom>
+          <a:ln w="9525">
+            <a:solidFill>
+              <a:schemeClr val="tx1"/>
+            </a:solidFill>
+            <a:tailEnd type="arrow" w="lg" len="lg"/>
+          </a:ln>
+        </p:spPr>
+        <p:style>
+          <a:lnRef idx="1">
+            <a:schemeClr val="accent1"/>
+          </a:lnRef>
+          <a:fillRef idx="0">
+            <a:schemeClr val="accent1"/>
+          </a:fillRef>
+          <a:effectRef idx="0">
+            <a:schemeClr val="accent1"/>
+          </a:effectRef>
+          <a:fontRef idx="minor">
+            <a:schemeClr val="tx1"/>
+          </a:fontRef>
+        </p:style>
+      </p:cxnSp>
+      <p:cxnSp>
+        <p:nvCxnSpPr>
+          <p:cNvPr id="11" name="10 Düz Ok Bağlayıcısı"/>
+          <p:cNvCxnSpPr/>
+          <p:nvPr/>
+        </p:nvCxnSpPr>
+        <p:spPr>
+          <a:xfrm>
+            <a:off x="3576255" y="1340768"/>
+            <a:ext cx="216024" cy="0"/>
+          </a:xfrm>
+          <a:prstGeom prst="straightConnector1">
+            <a:avLst/>
+          </a:prstGeom>
+          <a:ln w="9525">
+            <a:solidFill>
+              <a:schemeClr val="tx1"/>
+            </a:solidFill>
+            <a:tailEnd type="arrow" w="lg" len="lg"/>
+          </a:ln>
+        </p:spPr>
+        <p:style>
+          <a:lnRef idx="1">
+            <a:schemeClr val="accent1"/>
+          </a:lnRef>
+          <a:fillRef idx="0">
+            <a:schemeClr val="accent1"/>
+          </a:fillRef>
+          <a:effectRef idx="0">
+            <a:schemeClr val="accent1"/>
+          </a:effectRef>
+          <a:fontRef idx="minor">
+            <a:schemeClr val="tx1"/>
+          </a:fontRef>
+        </p:style>
+      </p:cxnSp>
+      <p:cxnSp>
+        <p:nvCxnSpPr>
+          <p:cNvPr id="12" name="11 Düz Ok Bağlayıcısı"/>
+          <p:cNvCxnSpPr/>
+          <p:nvPr/>
+        </p:nvCxnSpPr>
+        <p:spPr>
+          <a:xfrm>
+            <a:off x="5349622" y="1340768"/>
+            <a:ext cx="216024" cy="0"/>
+          </a:xfrm>
+          <a:prstGeom prst="straightConnector1">
+            <a:avLst/>
+          </a:prstGeom>
+          <a:ln w="9525">
+            <a:solidFill>
+              <a:schemeClr val="tx1"/>
+            </a:solidFill>
+            <a:tailEnd type="arrow" w="lg" len="lg"/>
+          </a:ln>
+        </p:spPr>
+        <p:style>
+          <a:lnRef idx="1">
+            <a:schemeClr val="accent1"/>
+          </a:lnRef>
+          <a:fillRef idx="0">
+            <a:schemeClr val="accent1"/>
+          </a:fillRef>
+          <a:effectRef idx="0">
+            <a:schemeClr val="accent1"/>
+          </a:effectRef>
+          <a:fontRef idx="minor">
+            <a:schemeClr val="tx1"/>
+          </a:fontRef>
+        </p:style>
+      </p:cxnSp>
+      <p:cxnSp>
+        <p:nvCxnSpPr>
+          <p:cNvPr id="13" name="12 Düz Ok Bağlayıcısı"/>
+          <p:cNvCxnSpPr/>
+          <p:nvPr/>
+        </p:nvCxnSpPr>
+        <p:spPr>
+          <a:xfrm rot="5400000">
+            <a:off x="6087479" y="2096852"/>
+            <a:ext cx="216024" cy="0"/>
+          </a:xfrm>
+          <a:prstGeom prst="straightConnector1">
+            <a:avLst/>
+          </a:prstGeom>
+          <a:ln w="9525">
+            <a:solidFill>
+              <a:schemeClr val="tx1"/>
+            </a:solidFill>
+            <a:tailEnd type="arrow" w="lg" len="lg"/>
+          </a:ln>
+        </p:spPr>
+        <p:style>
+          <a:lnRef idx="1">
+            <a:schemeClr val="accent1"/>
+          </a:lnRef>
+          <a:fillRef idx="0">
+            <a:schemeClr val="accent1"/>
+          </a:fillRef>
+          <a:effectRef idx="0">
+            <a:schemeClr val="accent1"/>
+          </a:effectRef>
+          <a:fontRef idx="minor">
+            <a:schemeClr val="tx1"/>
+          </a:fontRef>
+        </p:style>
+      </p:cxnSp>
+      <p:sp>
+        <p:nvSpPr>
+          <p:cNvPr id="14" name="13 Metin kutusu"/>
+          <p:cNvSpPr txBox="1"/>
+          <p:nvPr/>
+        </p:nvSpPr>
+        <p:spPr>
+          <a:xfrm>
+            <a:off x="5508104" y="2204864"/>
+            <a:ext cx="1374864" cy="307777"/>
+          </a:xfrm>
+          <a:prstGeom prst="rect">
+            <a:avLst/>
+          </a:prstGeom>
+          <a:noFill/>
+          <a:ln>
+            <a:solidFill>
+              <a:schemeClr val="tx1"/>
+            </a:solidFill>
+          </a:ln>
+        </p:spPr>
+        <p:txBody>
+          <a:bodyPr wrap="none" rtlCol="0">
+            <a:spAutoFit/>
+          </a:bodyPr>
+          <a:lstStyle/>
+          <a:p>
+            <a:r>
+              <a:rPr lang="en-US" sz="1400" dirty="0" smtClean="0"/>
+              <a:t>Generated Code</a:t>
+            </a:r>
+            <a:endParaRPr lang="en-US" sz="1400" dirty="0"/>
+          </a:p>
+        </p:txBody>
+      </p:sp>
+    </p:spTree>
+  </p:cSld>
+  <p:clrMapOvr>
+    <a:masterClrMapping/>
+  </p:clrMapOvr>
+</p:sld>
+</file>
+
 <file path=ppt/theme/theme1.xml><?xml version="1.0" encoding="utf-8"?>
 <a:theme xmlns:a="http://schemas.openxmlformats.org/drawingml/2006/main" name="Ofis Teması">
   <a:themeElements>

</xml_diff>

<commit_message>
Embedded coder paper works
Scenarios are developed for comparison and performance upgrade.
DC offset calculater are reaaranged for stand-by case
</commit_message>
<xml_diff>
--- a/Parameter Estimation Works/Embedded coder Paper/IEEETransactions_Word/Figures_embedded coder paper.pptx
+++ b/Parameter Estimation Works/Embedded coder Paper/IEEETransactions_Word/Figures_embedded coder paper.pptx
@@ -8,6 +8,15 @@
     <p:sldId id="256" r:id="rId2"/>
     <p:sldId id="257" r:id="rId3"/>
     <p:sldId id="258" r:id="rId4"/>
+    <p:sldId id="259" r:id="rId5"/>
+    <p:sldId id="260" r:id="rId6"/>
+    <p:sldId id="261" r:id="rId7"/>
+    <p:sldId id="262" r:id="rId8"/>
+    <p:sldId id="265" r:id="rId9"/>
+    <p:sldId id="266" r:id="rId10"/>
+    <p:sldId id="267" r:id="rId11"/>
+    <p:sldId id="263" r:id="rId12"/>
+    <p:sldId id="268" r:id="rId13"/>
   </p:sldIdLst>
   <p:sldSz cx="9144000" cy="6858000" type="screen4x3"/>
   <p:notesSz cx="6858000" cy="9144000"/>
@@ -291,7 +300,7 @@
             <a:fld id="{D9F75050-0E15-4C5B-92B0-66D068882F1F}" type="datetimeFigureOut">
               <a:rPr lang="tr-TR" smtClean="0"/>
               <a:pPr/>
-              <a:t>04.01.2021</a:t>
+              <a:t>10.01.2021</a:t>
             </a:fld>
             <a:endParaRPr lang="tr-TR"/>
           </a:p>
@@ -458,7 +467,7 @@
             <a:fld id="{D9F75050-0E15-4C5B-92B0-66D068882F1F}" type="datetimeFigureOut">
               <a:rPr lang="tr-TR" smtClean="0"/>
               <a:pPr/>
-              <a:t>04.01.2021</a:t>
+              <a:t>10.01.2021</a:t>
             </a:fld>
             <a:endParaRPr lang="tr-TR"/>
           </a:p>
@@ -635,7 +644,7 @@
             <a:fld id="{D9F75050-0E15-4C5B-92B0-66D068882F1F}" type="datetimeFigureOut">
               <a:rPr lang="tr-TR" smtClean="0"/>
               <a:pPr/>
-              <a:t>04.01.2021</a:t>
+              <a:t>10.01.2021</a:t>
             </a:fld>
             <a:endParaRPr lang="tr-TR"/>
           </a:p>
@@ -802,7 +811,7 @@
             <a:fld id="{D9F75050-0E15-4C5B-92B0-66D068882F1F}" type="datetimeFigureOut">
               <a:rPr lang="tr-TR" smtClean="0"/>
               <a:pPr/>
-              <a:t>04.01.2021</a:t>
+              <a:t>10.01.2021</a:t>
             </a:fld>
             <a:endParaRPr lang="tr-TR"/>
           </a:p>
@@ -1045,7 +1054,7 @@
             <a:fld id="{D9F75050-0E15-4C5B-92B0-66D068882F1F}" type="datetimeFigureOut">
               <a:rPr lang="tr-TR" smtClean="0"/>
               <a:pPr/>
-              <a:t>04.01.2021</a:t>
+              <a:t>10.01.2021</a:t>
             </a:fld>
             <a:endParaRPr lang="tr-TR"/>
           </a:p>
@@ -1330,7 +1339,7 @@
             <a:fld id="{D9F75050-0E15-4C5B-92B0-66D068882F1F}" type="datetimeFigureOut">
               <a:rPr lang="tr-TR" smtClean="0"/>
               <a:pPr/>
-              <a:t>04.01.2021</a:t>
+              <a:t>10.01.2021</a:t>
             </a:fld>
             <a:endParaRPr lang="tr-TR"/>
           </a:p>
@@ -1749,7 +1758,7 @@
             <a:fld id="{D9F75050-0E15-4C5B-92B0-66D068882F1F}" type="datetimeFigureOut">
               <a:rPr lang="tr-TR" smtClean="0"/>
               <a:pPr/>
-              <a:t>04.01.2021</a:t>
+              <a:t>10.01.2021</a:t>
             </a:fld>
             <a:endParaRPr lang="tr-TR"/>
           </a:p>
@@ -1864,7 +1873,7 @@
             <a:fld id="{D9F75050-0E15-4C5B-92B0-66D068882F1F}" type="datetimeFigureOut">
               <a:rPr lang="tr-TR" smtClean="0"/>
               <a:pPr/>
-              <a:t>04.01.2021</a:t>
+              <a:t>10.01.2021</a:t>
             </a:fld>
             <a:endParaRPr lang="tr-TR"/>
           </a:p>
@@ -1956,7 +1965,7 @@
             <a:fld id="{D9F75050-0E15-4C5B-92B0-66D068882F1F}" type="datetimeFigureOut">
               <a:rPr lang="tr-TR" smtClean="0"/>
               <a:pPr/>
-              <a:t>04.01.2021</a:t>
+              <a:t>10.01.2021</a:t>
             </a:fld>
             <a:endParaRPr lang="tr-TR"/>
           </a:p>
@@ -2230,7 +2239,7 @@
             <a:fld id="{D9F75050-0E15-4C5B-92B0-66D068882F1F}" type="datetimeFigureOut">
               <a:rPr lang="tr-TR" smtClean="0"/>
               <a:pPr/>
-              <a:t>04.01.2021</a:t>
+              <a:t>10.01.2021</a:t>
             </a:fld>
             <a:endParaRPr lang="tr-TR"/>
           </a:p>
@@ -2480,7 +2489,7 @@
             <a:fld id="{D9F75050-0E15-4C5B-92B0-66D068882F1F}" type="datetimeFigureOut">
               <a:rPr lang="tr-TR" smtClean="0"/>
               <a:pPr/>
-              <a:t>04.01.2021</a:t>
+              <a:t>10.01.2021</a:t>
             </a:fld>
             <a:endParaRPr lang="tr-TR"/>
           </a:p>
@@ -2690,7 +2699,7 @@
             <a:fld id="{D9F75050-0E15-4C5B-92B0-66D068882F1F}" type="datetimeFigureOut">
               <a:rPr lang="tr-TR" smtClean="0"/>
               <a:pPr/>
-              <a:t>04.01.2021</a:t>
+              <a:t>10.01.2021</a:t>
             </a:fld>
             <a:endParaRPr lang="tr-TR"/>
           </a:p>
@@ -3319,6 +3328,387 @@
           <a:p>
             <a:pPr algn="ctr"/>
             <a:endParaRPr lang="en-US"/>
+          </a:p>
+        </p:txBody>
+      </p:sp>
+    </p:spTree>
+  </p:cSld>
+  <p:clrMapOvr>
+    <a:masterClrMapping/>
+  </p:clrMapOvr>
+</p:sld>
+</file>
+
+<file path=ppt/slides/slide10.xml><?xml version="1.0" encoding="utf-8"?>
+<p:sld xmlns:a="http://schemas.openxmlformats.org/drawingml/2006/main" xmlns:r="http://schemas.openxmlformats.org/officeDocument/2006/relationships" xmlns:p="http://schemas.openxmlformats.org/presentationml/2006/main">
+  <p:cSld>
+    <p:spTree>
+      <p:nvGrpSpPr>
+        <p:cNvPr id="1" name=""/>
+        <p:cNvGrpSpPr/>
+        <p:nvPr/>
+      </p:nvGrpSpPr>
+      <p:grpSpPr>
+        <a:xfrm>
+          <a:off x="0" y="0"/>
+          <a:ext cx="0" cy="0"/>
+          <a:chOff x="0" y="0"/>
+          <a:chExt cx="0" cy="0"/>
+        </a:xfrm>
+      </p:grpSpPr>
+      <p:pic>
+        <p:nvPicPr>
+          <p:cNvPr id="1026" name="Picture 2"/>
+          <p:cNvPicPr>
+            <a:picLocks noGrp="1" noChangeAspect="1" noChangeArrowheads="1"/>
+          </p:cNvPicPr>
+          <p:nvPr>
+            <p:ph idx="1"/>
+          </p:nvPr>
+        </p:nvPicPr>
+        <p:blipFill>
+          <a:blip r:embed="rId2" cstate="print"/>
+          <a:srcRect/>
+          <a:stretch>
+            <a:fillRect/>
+          </a:stretch>
+        </p:blipFill>
+        <p:spPr bwMode="auto">
+          <a:xfrm>
+            <a:off x="35496" y="1703712"/>
+            <a:ext cx="3151755" cy="5109664"/>
+          </a:xfrm>
+          <a:prstGeom prst="rect">
+            <a:avLst/>
+          </a:prstGeom>
+          <a:noFill/>
+          <a:ln w="9525">
+            <a:noFill/>
+            <a:miter lim="800000"/>
+            <a:headEnd/>
+            <a:tailEnd/>
+          </a:ln>
+        </p:spPr>
+      </p:pic>
+      <p:pic>
+        <p:nvPicPr>
+          <p:cNvPr id="1027" name="Picture 3"/>
+          <p:cNvPicPr>
+            <a:picLocks noChangeAspect="1" noChangeArrowheads="1"/>
+          </p:cNvPicPr>
+          <p:nvPr/>
+        </p:nvPicPr>
+        <p:blipFill>
+          <a:blip r:embed="rId3" cstate="print"/>
+          <a:srcRect/>
+          <a:stretch>
+            <a:fillRect/>
+          </a:stretch>
+        </p:blipFill>
+        <p:spPr bwMode="auto">
+          <a:xfrm>
+            <a:off x="4067944" y="2348880"/>
+            <a:ext cx="4656203" cy="4238029"/>
+          </a:xfrm>
+          <a:prstGeom prst="rect">
+            <a:avLst/>
+          </a:prstGeom>
+          <a:noFill/>
+          <a:ln w="9525">
+            <a:solidFill>
+              <a:schemeClr val="accent1"/>
+            </a:solidFill>
+            <a:miter lim="800000"/>
+            <a:headEnd/>
+            <a:tailEnd/>
+          </a:ln>
+        </p:spPr>
+      </p:pic>
+      <p:pic>
+        <p:nvPicPr>
+          <p:cNvPr id="6" name="Picture 2"/>
+          <p:cNvPicPr>
+            <a:picLocks noChangeAspect="1" noChangeArrowheads="1"/>
+          </p:cNvPicPr>
+          <p:nvPr/>
+        </p:nvPicPr>
+        <p:blipFill>
+          <a:blip r:embed="rId4" cstate="print"/>
+          <a:srcRect/>
+          <a:stretch>
+            <a:fillRect/>
+          </a:stretch>
+        </p:blipFill>
+        <p:spPr bwMode="auto">
+          <a:xfrm>
+            <a:off x="2411760" y="116632"/>
+            <a:ext cx="4046651" cy="1656184"/>
+          </a:xfrm>
+          <a:prstGeom prst="rect">
+            <a:avLst/>
+          </a:prstGeom>
+          <a:noFill/>
+          <a:ln w="9525">
+            <a:noFill/>
+            <a:miter lim="800000"/>
+            <a:headEnd/>
+            <a:tailEnd/>
+          </a:ln>
+        </p:spPr>
+      </p:pic>
+      <p:cxnSp>
+        <p:nvCxnSpPr>
+          <p:cNvPr id="10" name="9 Düz Ok Bağlayıcısı"/>
+          <p:cNvCxnSpPr/>
+          <p:nvPr/>
+        </p:nvCxnSpPr>
+        <p:spPr>
+          <a:xfrm>
+            <a:off x="4932040" y="908720"/>
+            <a:ext cx="0" cy="1440160"/>
+          </a:xfrm>
+          <a:prstGeom prst="straightConnector1">
+            <a:avLst/>
+          </a:prstGeom>
+          <a:ln>
+            <a:tailEnd type="arrow"/>
+          </a:ln>
+        </p:spPr>
+        <p:style>
+          <a:lnRef idx="1">
+            <a:schemeClr val="accent1"/>
+          </a:lnRef>
+          <a:fillRef idx="0">
+            <a:schemeClr val="accent1"/>
+          </a:fillRef>
+          <a:effectRef idx="0">
+            <a:schemeClr val="accent1"/>
+          </a:effectRef>
+          <a:fontRef idx="minor">
+            <a:schemeClr val="tx1"/>
+          </a:fontRef>
+        </p:style>
+      </p:cxnSp>
+    </p:spTree>
+  </p:cSld>
+  <p:clrMapOvr>
+    <a:masterClrMapping/>
+  </p:clrMapOvr>
+</p:sld>
+</file>
+
+<file path=ppt/slides/slide11.xml><?xml version="1.0" encoding="utf-8"?>
+<p:sld xmlns:a="http://schemas.openxmlformats.org/drawingml/2006/main" xmlns:r="http://schemas.openxmlformats.org/officeDocument/2006/relationships" xmlns:p="http://schemas.openxmlformats.org/presentationml/2006/main">
+  <p:cSld>
+    <p:spTree>
+      <p:nvGrpSpPr>
+        <p:cNvPr id="1" name=""/>
+        <p:cNvGrpSpPr/>
+        <p:nvPr/>
+      </p:nvGrpSpPr>
+      <p:grpSpPr>
+        <a:xfrm>
+          <a:off x="0" y="0"/>
+          <a:ext cx="0" cy="0"/>
+          <a:chOff x="0" y="0"/>
+          <a:chExt cx="0" cy="0"/>
+        </a:xfrm>
+      </p:grpSpPr>
+      <p:pic>
+        <p:nvPicPr>
+          <p:cNvPr id="5122" name="Picture 2"/>
+          <p:cNvPicPr>
+            <a:picLocks noGrp="1" noChangeAspect="1" noChangeArrowheads="1"/>
+          </p:cNvPicPr>
+          <p:nvPr>
+            <p:ph idx="1"/>
+          </p:nvPr>
+        </p:nvPicPr>
+        <p:blipFill>
+          <a:blip r:embed="rId2" cstate="print"/>
+          <a:srcRect/>
+          <a:stretch>
+            <a:fillRect/>
+          </a:stretch>
+        </p:blipFill>
+        <p:spPr bwMode="auto">
+          <a:xfrm>
+            <a:off x="1835696" y="2636912"/>
+            <a:ext cx="6457950" cy="3895725"/>
+          </a:xfrm>
+          <a:prstGeom prst="rect">
+            <a:avLst/>
+          </a:prstGeom>
+          <a:noFill/>
+          <a:ln w="9525">
+            <a:solidFill>
+              <a:schemeClr val="accent1"/>
+            </a:solidFill>
+            <a:miter lim="800000"/>
+            <a:headEnd/>
+            <a:tailEnd/>
+          </a:ln>
+        </p:spPr>
+      </p:pic>
+      <p:pic>
+        <p:nvPicPr>
+          <p:cNvPr id="5" name="Picture 2"/>
+          <p:cNvPicPr>
+            <a:picLocks noChangeAspect="1" noChangeArrowheads="1"/>
+          </p:cNvPicPr>
+          <p:nvPr/>
+        </p:nvPicPr>
+        <p:blipFill>
+          <a:blip r:embed="rId3" cstate="print"/>
+          <a:srcRect/>
+          <a:stretch>
+            <a:fillRect/>
+          </a:stretch>
+        </p:blipFill>
+        <p:spPr bwMode="auto">
+          <a:xfrm>
+            <a:off x="2483768" y="0"/>
+            <a:ext cx="6192688" cy="1798743"/>
+          </a:xfrm>
+          <a:prstGeom prst="rect">
+            <a:avLst/>
+          </a:prstGeom>
+          <a:noFill/>
+          <a:ln w="9525">
+            <a:noFill/>
+            <a:miter lim="800000"/>
+            <a:headEnd/>
+            <a:tailEnd/>
+          </a:ln>
+        </p:spPr>
+      </p:pic>
+      <p:cxnSp>
+        <p:nvCxnSpPr>
+          <p:cNvPr id="6" name="5 Düz Ok Bağlayıcısı"/>
+          <p:cNvCxnSpPr/>
+          <p:nvPr/>
+        </p:nvCxnSpPr>
+        <p:spPr>
+          <a:xfrm flipH="1">
+            <a:off x="6660232" y="908720"/>
+            <a:ext cx="1728192" cy="1728192"/>
+          </a:xfrm>
+          <a:prstGeom prst="straightConnector1">
+            <a:avLst/>
+          </a:prstGeom>
+          <a:ln>
+            <a:tailEnd type="arrow"/>
+          </a:ln>
+        </p:spPr>
+        <p:style>
+          <a:lnRef idx="1">
+            <a:schemeClr val="accent1"/>
+          </a:lnRef>
+          <a:fillRef idx="0">
+            <a:schemeClr val="accent1"/>
+          </a:fillRef>
+          <a:effectRef idx="0">
+            <a:schemeClr val="accent1"/>
+          </a:effectRef>
+          <a:fontRef idx="minor">
+            <a:schemeClr val="tx1"/>
+          </a:fontRef>
+        </p:style>
+      </p:cxnSp>
+      <p:sp>
+        <p:nvSpPr>
+          <p:cNvPr id="11" name="10 Metin kutusu"/>
+          <p:cNvSpPr txBox="1"/>
+          <p:nvPr/>
+        </p:nvSpPr>
+        <p:spPr>
+          <a:xfrm>
+            <a:off x="179512" y="260648"/>
+            <a:ext cx="2145203" cy="923330"/>
+          </a:xfrm>
+          <a:prstGeom prst="rect">
+            <a:avLst/>
+          </a:prstGeom>
+          <a:noFill/>
+        </p:spPr>
+        <p:txBody>
+          <a:bodyPr wrap="none" rtlCol="0">
+            <a:spAutoFit/>
+          </a:bodyPr>
+          <a:lstStyle/>
+          <a:p>
+            <a:r>
+              <a:rPr lang="en-US" dirty="0" smtClean="0"/>
+              <a:t>ADC offset calculator</a:t>
+            </a:r>
+          </a:p>
+          <a:p>
+            <a:r>
+              <a:rPr lang="en-US" dirty="0" smtClean="0"/>
+              <a:t>When</a:t>
+            </a:r>
+          </a:p>
+          <a:p>
+            <a:r>
+              <a:rPr lang="en-US" dirty="0" smtClean="0"/>
+              <a:t>initialize</a:t>
+            </a:r>
+            <a:endParaRPr lang="en-US" dirty="0"/>
+          </a:p>
+        </p:txBody>
+      </p:sp>
+    </p:spTree>
+  </p:cSld>
+  <p:clrMapOvr>
+    <a:masterClrMapping/>
+  </p:clrMapOvr>
+</p:sld>
+</file>
+
+<file path=ppt/slides/slide12.xml><?xml version="1.0" encoding="utf-8"?>
+<p:sld xmlns:a="http://schemas.openxmlformats.org/drawingml/2006/main" xmlns:r="http://schemas.openxmlformats.org/officeDocument/2006/relationships" xmlns:p="http://schemas.openxmlformats.org/presentationml/2006/main">
+  <p:cSld>
+    <p:spTree>
+      <p:nvGrpSpPr>
+        <p:cNvPr id="1" name=""/>
+        <p:cNvGrpSpPr/>
+        <p:nvPr/>
+      </p:nvGrpSpPr>
+      <p:grpSpPr>
+        <a:xfrm>
+          <a:off x="0" y="0"/>
+          <a:ext cx="0" cy="0"/>
+          <a:chOff x="0" y="0"/>
+          <a:chExt cx="0" cy="0"/>
+        </a:xfrm>
+      </p:grpSpPr>
+      <p:sp>
+        <p:nvSpPr>
+          <p:cNvPr id="2" name="1 Başlık"/>
+          <p:cNvSpPr>
+            <a:spLocks noGrp="1"/>
+          </p:cNvSpPr>
+          <p:nvPr>
+            <p:ph type="title"/>
+          </p:nvPr>
+        </p:nvSpPr>
+        <p:spPr>
+          <a:xfrm>
+            <a:off x="467544" y="2780928"/>
+            <a:ext cx="8229600" cy="1143000"/>
+          </a:xfrm>
+        </p:spPr>
+        <p:txBody>
+          <a:bodyPr>
+            <a:normAutofit fontScale="90000"/>
+          </a:bodyPr>
+          <a:lstStyle/>
+          <a:p>
+            <a:r>
+              <a:rPr lang="en-US" dirty="0" smtClean="0"/>
+              <a:t>Next job: host screen for easy control and track</a:t>
+            </a:r>
+            <a:endParaRPr lang="en-US" dirty="0"/>
           </a:p>
         </p:txBody>
       </p:sp>
@@ -3673,7 +4063,7 @@
         </p:nvSpPr>
         <p:spPr>
           <a:xfrm>
-            <a:off x="1187624" y="1124744"/>
+            <a:off x="1668768" y="2924944"/>
             <a:ext cx="1062407" cy="461665"/>
           </a:xfrm>
           <a:prstGeom prst="rect">
@@ -3717,7 +4107,7 @@
         </p:nvSpPr>
         <p:spPr>
           <a:xfrm>
-            <a:off x="2487145" y="1124744"/>
+            <a:off x="2968289" y="2924944"/>
             <a:ext cx="1078565" cy="830997"/>
           </a:xfrm>
           <a:prstGeom prst="rect">
@@ -3756,7 +4146,6 @@
               <a:rPr lang="tr-TR" sz="1200" dirty="0" smtClean="0"/>
               <a:t>+</a:t>
             </a:r>
-            <a:endParaRPr lang="tr-TR" sz="1200" dirty="0" smtClean="0"/>
           </a:p>
           <a:p>
             <a:pPr algn="ctr"/>
@@ -3776,7 +4165,7 @@
         </p:nvSpPr>
         <p:spPr>
           <a:xfrm>
-            <a:off x="3802824" y="1124744"/>
+            <a:off x="4283968" y="2924944"/>
             <a:ext cx="1536253" cy="1200329"/>
           </a:xfrm>
           <a:prstGeom prst="rect">
@@ -3863,7 +4252,7 @@
         </p:nvSpPr>
         <p:spPr>
           <a:xfrm>
-            <a:off x="5586735" y="1124744"/>
+            <a:off x="6067879" y="2924944"/>
             <a:ext cx="1217513" cy="830997"/>
           </a:xfrm>
           <a:prstGeom prst="rect">
@@ -3921,7 +4310,7 @@
         </p:nvCxnSpPr>
         <p:spPr>
           <a:xfrm>
-            <a:off x="2260576" y="1340768"/>
+            <a:off x="2741720" y="3140968"/>
             <a:ext cx="216024" cy="0"/>
           </a:xfrm>
           <a:prstGeom prst="straightConnector1">
@@ -3957,7 +4346,7 @@
         </p:nvCxnSpPr>
         <p:spPr>
           <a:xfrm>
-            <a:off x="3576255" y="1340768"/>
+            <a:off x="4057399" y="3140968"/>
             <a:ext cx="216024" cy="0"/>
           </a:xfrm>
           <a:prstGeom prst="straightConnector1">
@@ -3993,7 +4382,7 @@
         </p:nvCxnSpPr>
         <p:spPr>
           <a:xfrm>
-            <a:off x="5349622" y="1340768"/>
+            <a:off x="5830766" y="3140968"/>
             <a:ext cx="216024" cy="0"/>
           </a:xfrm>
           <a:prstGeom prst="straightConnector1">
@@ -4029,7 +4418,7 @@
         </p:nvCxnSpPr>
         <p:spPr>
           <a:xfrm rot="5400000">
-            <a:off x="6087479" y="2096852"/>
+            <a:off x="6568623" y="3897052"/>
             <a:ext cx="216024" cy="0"/>
           </a:xfrm>
           <a:prstGeom prst="straightConnector1">
@@ -4065,7 +4454,7 @@
         </p:nvSpPr>
         <p:spPr>
           <a:xfrm>
-            <a:off x="5508104" y="2204864"/>
+            <a:off x="5989248" y="4005064"/>
             <a:ext cx="1374864" cy="307777"/>
           </a:xfrm>
           <a:prstGeom prst="rect">
@@ -4089,6 +4478,1062 @@
               <a:t>Generated Code</a:t>
             </a:r>
             <a:endParaRPr lang="en-US" sz="1400" dirty="0"/>
+          </a:p>
+        </p:txBody>
+      </p:sp>
+    </p:spTree>
+  </p:cSld>
+  <p:clrMapOvr>
+    <a:masterClrMapping/>
+  </p:clrMapOvr>
+</p:sld>
+</file>
+
+<file path=ppt/slides/slide4.xml><?xml version="1.0" encoding="utf-8"?>
+<p:sld xmlns:a="http://schemas.openxmlformats.org/drawingml/2006/main" xmlns:r="http://schemas.openxmlformats.org/officeDocument/2006/relationships" xmlns:p="http://schemas.openxmlformats.org/presentationml/2006/main">
+  <p:cSld>
+    <p:spTree>
+      <p:nvGrpSpPr>
+        <p:cNvPr id="1" name=""/>
+        <p:cNvGrpSpPr/>
+        <p:nvPr/>
+      </p:nvGrpSpPr>
+      <p:grpSpPr>
+        <a:xfrm>
+          <a:off x="0" y="0"/>
+          <a:ext cx="0" cy="0"/>
+          <a:chOff x="0" y="0"/>
+          <a:chExt cx="0" cy="0"/>
+        </a:xfrm>
+      </p:grpSpPr>
+      <p:sp>
+        <p:nvSpPr>
+          <p:cNvPr id="4" name="3 Başlık"/>
+          <p:cNvSpPr>
+            <a:spLocks noGrp="1"/>
+          </p:cNvSpPr>
+          <p:nvPr>
+            <p:ph type="title"/>
+          </p:nvPr>
+        </p:nvSpPr>
+        <p:spPr>
+          <a:xfrm>
+            <a:off x="457200" y="-27384"/>
+            <a:ext cx="8229600" cy="1143000"/>
+          </a:xfrm>
+        </p:spPr>
+        <p:txBody>
+          <a:bodyPr/>
+          <a:lstStyle/>
+          <a:p>
+            <a:r>
+              <a:rPr lang="en-US" dirty="0" smtClean="0"/>
+              <a:t>TI  software strategy</a:t>
+            </a:r>
+            <a:endParaRPr lang="en-US" dirty="0"/>
+          </a:p>
+        </p:txBody>
+      </p:sp>
+      <p:pic>
+        <p:nvPicPr>
+          <p:cNvPr id="1026" name="Picture 2"/>
+          <p:cNvPicPr>
+            <a:picLocks noGrp="1" noChangeAspect="1" noChangeArrowheads="1"/>
+          </p:cNvPicPr>
+          <p:nvPr>
+            <p:ph sz="half" idx="1"/>
+          </p:nvPr>
+        </p:nvPicPr>
+        <p:blipFill>
+          <a:blip r:embed="rId2" cstate="print"/>
+          <a:srcRect/>
+          <a:stretch>
+            <a:fillRect/>
+          </a:stretch>
+        </p:blipFill>
+        <p:spPr bwMode="auto">
+          <a:xfrm>
+            <a:off x="0" y="2636912"/>
+            <a:ext cx="4634870" cy="2664296"/>
+          </a:xfrm>
+          <a:prstGeom prst="rect">
+            <a:avLst/>
+          </a:prstGeom>
+          <a:noFill/>
+          <a:ln w="9525">
+            <a:noFill/>
+            <a:miter lim="800000"/>
+            <a:headEnd/>
+            <a:tailEnd/>
+          </a:ln>
+        </p:spPr>
+      </p:pic>
+      <p:pic>
+        <p:nvPicPr>
+          <p:cNvPr id="1027" name="Picture 3"/>
+          <p:cNvPicPr>
+            <a:picLocks noGrp="1" noChangeAspect="1" noChangeArrowheads="1"/>
+          </p:cNvPicPr>
+          <p:nvPr>
+            <p:ph sz="half" idx="2"/>
+          </p:nvPr>
+        </p:nvPicPr>
+        <p:blipFill>
+          <a:blip r:embed="rId3" cstate="print"/>
+          <a:srcRect/>
+          <a:stretch>
+            <a:fillRect/>
+          </a:stretch>
+        </p:blipFill>
+        <p:spPr bwMode="auto">
+          <a:xfrm>
+            <a:off x="4894944" y="1340768"/>
+            <a:ext cx="4249056" cy="5102027"/>
+          </a:xfrm>
+          <a:prstGeom prst="rect">
+            <a:avLst/>
+          </a:prstGeom>
+          <a:noFill/>
+          <a:ln w="9525">
+            <a:noFill/>
+            <a:miter lim="800000"/>
+            <a:headEnd/>
+            <a:tailEnd/>
+          </a:ln>
+        </p:spPr>
+      </p:pic>
+    </p:spTree>
+  </p:cSld>
+  <p:clrMapOvr>
+    <a:masterClrMapping/>
+  </p:clrMapOvr>
+</p:sld>
+</file>
+
+<file path=ppt/slides/slide5.xml><?xml version="1.0" encoding="utf-8"?>
+<p:sld xmlns:a="http://schemas.openxmlformats.org/drawingml/2006/main" xmlns:r="http://schemas.openxmlformats.org/officeDocument/2006/relationships" xmlns:p="http://schemas.openxmlformats.org/presentationml/2006/main">
+  <p:cSld>
+    <p:spTree>
+      <p:nvGrpSpPr>
+        <p:cNvPr id="1" name=""/>
+        <p:cNvGrpSpPr/>
+        <p:nvPr/>
+      </p:nvGrpSpPr>
+      <p:grpSpPr>
+        <a:xfrm>
+          <a:off x="0" y="0"/>
+          <a:ext cx="0" cy="0"/>
+          <a:chOff x="0" y="0"/>
+          <a:chExt cx="0" cy="0"/>
+        </a:xfrm>
+      </p:grpSpPr>
+      <p:sp>
+        <p:nvSpPr>
+          <p:cNvPr id="2" name="1 Başlık"/>
+          <p:cNvSpPr>
+            <a:spLocks noGrp="1"/>
+          </p:cNvSpPr>
+          <p:nvPr>
+            <p:ph type="title"/>
+          </p:nvPr>
+        </p:nvSpPr>
+        <p:spPr>
+          <a:xfrm>
+            <a:off x="395536" y="0"/>
+            <a:ext cx="8229600" cy="980728"/>
+          </a:xfrm>
+        </p:spPr>
+        <p:txBody>
+          <a:bodyPr/>
+          <a:lstStyle/>
+          <a:p>
+            <a:r>
+              <a:rPr lang="en-US" dirty="0" smtClean="0"/>
+              <a:t>TI  software strategy</a:t>
+            </a:r>
+            <a:endParaRPr lang="en-US" dirty="0"/>
+          </a:p>
+        </p:txBody>
+      </p:sp>
+      <p:pic>
+        <p:nvPicPr>
+          <p:cNvPr id="2050" name="Picture 2"/>
+          <p:cNvPicPr>
+            <a:picLocks noGrp="1" noChangeAspect="1" noChangeArrowheads="1"/>
+          </p:cNvPicPr>
+          <p:nvPr>
+            <p:ph idx="1"/>
+          </p:nvPr>
+        </p:nvPicPr>
+        <p:blipFill>
+          <a:blip r:embed="rId2" cstate="print"/>
+          <a:srcRect/>
+          <a:stretch>
+            <a:fillRect/>
+          </a:stretch>
+        </p:blipFill>
+        <p:spPr bwMode="auto">
+          <a:xfrm>
+            <a:off x="107504" y="908720"/>
+            <a:ext cx="8892480" cy="5878966"/>
+          </a:xfrm>
+          <a:prstGeom prst="rect">
+            <a:avLst/>
+          </a:prstGeom>
+          <a:noFill/>
+          <a:ln w="9525">
+            <a:noFill/>
+            <a:miter lim="800000"/>
+            <a:headEnd/>
+            <a:tailEnd/>
+          </a:ln>
+        </p:spPr>
+      </p:pic>
+    </p:spTree>
+  </p:cSld>
+  <p:clrMapOvr>
+    <a:masterClrMapping/>
+  </p:clrMapOvr>
+</p:sld>
+</file>
+
+<file path=ppt/slides/slide6.xml><?xml version="1.0" encoding="utf-8"?>
+<p:sld xmlns:a="http://schemas.openxmlformats.org/drawingml/2006/main" xmlns:r="http://schemas.openxmlformats.org/officeDocument/2006/relationships" xmlns:p="http://schemas.openxmlformats.org/presentationml/2006/main">
+  <p:cSld>
+    <p:spTree>
+      <p:nvGrpSpPr>
+        <p:cNvPr id="1" name=""/>
+        <p:cNvGrpSpPr/>
+        <p:nvPr/>
+      </p:nvGrpSpPr>
+      <p:grpSpPr>
+        <a:xfrm>
+          <a:off x="0" y="0"/>
+          <a:ext cx="0" cy="0"/>
+          <a:chOff x="0" y="0"/>
+          <a:chExt cx="0" cy="0"/>
+        </a:xfrm>
+      </p:grpSpPr>
+      <p:sp>
+        <p:nvSpPr>
+          <p:cNvPr id="2" name="1 Başlık"/>
+          <p:cNvSpPr>
+            <a:spLocks noGrp="1"/>
+          </p:cNvSpPr>
+          <p:nvPr>
+            <p:ph type="title"/>
+          </p:nvPr>
+        </p:nvSpPr>
+        <p:spPr>
+          <a:xfrm>
+            <a:off x="467544" y="0"/>
+            <a:ext cx="8229600" cy="836712"/>
+          </a:xfrm>
+        </p:spPr>
+        <p:txBody>
+          <a:bodyPr/>
+          <a:lstStyle/>
+          <a:p>
+            <a:r>
+              <a:rPr lang="en-US" dirty="0" smtClean="0"/>
+              <a:t>Executed macros</a:t>
+            </a:r>
+            <a:r>
+              <a:rPr lang="tr-TR" dirty="0" smtClean="0"/>
+              <a:t> &amp; </a:t>
+            </a:r>
+            <a:r>
+              <a:rPr lang="en-US" dirty="0" smtClean="0"/>
+              <a:t>modules</a:t>
+            </a:r>
+            <a:endParaRPr lang="en-US" dirty="0"/>
+          </a:p>
+        </p:txBody>
+      </p:sp>
+      <p:pic>
+        <p:nvPicPr>
+          <p:cNvPr id="3074" name="Picture 2"/>
+          <p:cNvPicPr>
+            <a:picLocks noGrp="1" noChangeAspect="1" noChangeArrowheads="1"/>
+          </p:cNvPicPr>
+          <p:nvPr>
+            <p:ph idx="1"/>
+          </p:nvPr>
+        </p:nvPicPr>
+        <p:blipFill>
+          <a:blip r:embed="rId2" cstate="print"/>
+          <a:srcRect/>
+          <a:stretch>
+            <a:fillRect/>
+          </a:stretch>
+        </p:blipFill>
+        <p:spPr bwMode="auto">
+          <a:xfrm>
+            <a:off x="1259632" y="764704"/>
+            <a:ext cx="5753100" cy="2257425"/>
+          </a:xfrm>
+          <a:prstGeom prst="rect">
+            <a:avLst/>
+          </a:prstGeom>
+          <a:noFill/>
+          <a:ln w="9525">
+            <a:noFill/>
+            <a:miter lim="800000"/>
+            <a:headEnd/>
+            <a:tailEnd/>
+          </a:ln>
+        </p:spPr>
+      </p:pic>
+      <p:pic>
+        <p:nvPicPr>
+          <p:cNvPr id="3075" name="Picture 3"/>
+          <p:cNvPicPr>
+            <a:picLocks noChangeAspect="1" noChangeArrowheads="1"/>
+          </p:cNvPicPr>
+          <p:nvPr/>
+        </p:nvPicPr>
+        <p:blipFill>
+          <a:blip r:embed="rId3" cstate="print"/>
+          <a:srcRect/>
+          <a:stretch>
+            <a:fillRect/>
+          </a:stretch>
+        </p:blipFill>
+        <p:spPr bwMode="auto">
+          <a:xfrm>
+            <a:off x="450249" y="3096344"/>
+            <a:ext cx="8298215" cy="3717032"/>
+          </a:xfrm>
+          <a:prstGeom prst="rect">
+            <a:avLst/>
+          </a:prstGeom>
+          <a:noFill/>
+          <a:ln w="9525">
+            <a:noFill/>
+            <a:miter lim="800000"/>
+            <a:headEnd/>
+            <a:tailEnd/>
+          </a:ln>
+        </p:spPr>
+      </p:pic>
+      <p:sp>
+        <p:nvSpPr>
+          <p:cNvPr id="6" name="5 Yuvarlatılmış Dikdörtgen"/>
+          <p:cNvSpPr/>
+          <p:nvPr/>
+        </p:nvSpPr>
+        <p:spPr>
+          <a:xfrm>
+            <a:off x="7092280" y="3140968"/>
+            <a:ext cx="720080" cy="3456384"/>
+          </a:xfrm>
+          <a:prstGeom prst="roundRect">
+            <a:avLst/>
+          </a:prstGeom>
+          <a:noFill/>
+          <a:ln>
+            <a:solidFill>
+              <a:srgbClr val="FF0000"/>
+            </a:solidFill>
+          </a:ln>
+        </p:spPr>
+        <p:style>
+          <a:lnRef idx="2">
+            <a:schemeClr val="accent1">
+              <a:shade val="50000"/>
+            </a:schemeClr>
+          </a:lnRef>
+          <a:fillRef idx="1">
+            <a:schemeClr val="accent1"/>
+          </a:fillRef>
+          <a:effectRef idx="0">
+            <a:schemeClr val="accent1"/>
+          </a:effectRef>
+          <a:fontRef idx="minor">
+            <a:schemeClr val="lt1"/>
+          </a:fontRef>
+        </p:style>
+        <p:txBody>
+          <a:bodyPr rtlCol="0" anchor="ctr"/>
+          <a:lstStyle/>
+          <a:p>
+            <a:pPr algn="ctr"/>
+            <a:endParaRPr lang="en-US"/>
+          </a:p>
+        </p:txBody>
+      </p:sp>
+      <p:sp>
+        <p:nvSpPr>
+          <p:cNvPr id="7" name="6 Metin kutusu"/>
+          <p:cNvSpPr txBox="1"/>
+          <p:nvPr/>
+        </p:nvSpPr>
+        <p:spPr>
+          <a:xfrm>
+            <a:off x="7092280" y="2636912"/>
+            <a:ext cx="725135" cy="523220"/>
+          </a:xfrm>
+          <a:prstGeom prst="rect">
+            <a:avLst/>
+          </a:prstGeom>
+          <a:noFill/>
+        </p:spPr>
+        <p:txBody>
+          <a:bodyPr wrap="none" rtlCol="0">
+            <a:spAutoFit/>
+          </a:bodyPr>
+          <a:lstStyle/>
+          <a:p>
+            <a:pPr algn="ctr"/>
+            <a:r>
+              <a:rPr lang="en-US" sz="1400" dirty="0" smtClean="0">
+                <a:solidFill>
+                  <a:srgbClr val="FF0000"/>
+                </a:solidFill>
+              </a:rPr>
+              <a:t>Speed </a:t>
+            </a:r>
+          </a:p>
+          <a:p>
+            <a:pPr algn="ctr"/>
+            <a:r>
+              <a:rPr lang="en-US" sz="1400" dirty="0" smtClean="0">
+                <a:solidFill>
+                  <a:srgbClr val="FF0000"/>
+                </a:solidFill>
+              </a:rPr>
+              <a:t>Control</a:t>
+            </a:r>
+            <a:endParaRPr lang="en-US" sz="1400" dirty="0">
+              <a:solidFill>
+                <a:srgbClr val="FF0000"/>
+              </a:solidFill>
+            </a:endParaRPr>
+          </a:p>
+        </p:txBody>
+      </p:sp>
+      <p:sp>
+        <p:nvSpPr>
+          <p:cNvPr id="8" name="7 Metin kutusu"/>
+          <p:cNvSpPr txBox="1"/>
+          <p:nvPr/>
+        </p:nvSpPr>
+        <p:spPr>
+          <a:xfrm>
+            <a:off x="7912615" y="2636912"/>
+            <a:ext cx="812658" cy="523220"/>
+          </a:xfrm>
+          <a:prstGeom prst="rect">
+            <a:avLst/>
+          </a:prstGeom>
+          <a:noFill/>
+        </p:spPr>
+        <p:txBody>
+          <a:bodyPr wrap="none" rtlCol="0">
+            <a:spAutoFit/>
+          </a:bodyPr>
+          <a:lstStyle/>
+          <a:p>
+            <a:pPr algn="ctr"/>
+            <a:r>
+              <a:rPr lang="en-US" sz="1400" dirty="0" smtClean="0"/>
+              <a:t>Position </a:t>
+            </a:r>
+          </a:p>
+          <a:p>
+            <a:pPr algn="ctr"/>
+            <a:r>
+              <a:rPr lang="en-US" sz="1400" dirty="0" smtClean="0"/>
+              <a:t>Control</a:t>
+            </a:r>
+            <a:endParaRPr lang="en-US" sz="1400" dirty="0"/>
+          </a:p>
+        </p:txBody>
+      </p:sp>
+    </p:spTree>
+  </p:cSld>
+  <p:clrMapOvr>
+    <a:masterClrMapping/>
+  </p:clrMapOvr>
+</p:sld>
+</file>
+
+<file path=ppt/slides/slide7.xml><?xml version="1.0" encoding="utf-8"?>
+<p:sld xmlns:a="http://schemas.openxmlformats.org/drawingml/2006/main" xmlns:r="http://schemas.openxmlformats.org/officeDocument/2006/relationships" xmlns:p="http://schemas.openxmlformats.org/presentationml/2006/main">
+  <p:cSld>
+    <p:spTree>
+      <p:nvGrpSpPr>
+        <p:cNvPr id="1" name=""/>
+        <p:cNvGrpSpPr/>
+        <p:nvPr/>
+      </p:nvGrpSpPr>
+      <p:grpSpPr>
+        <a:xfrm>
+          <a:off x="0" y="0"/>
+          <a:ext cx="0" cy="0"/>
+          <a:chOff x="0" y="0"/>
+          <a:chExt cx="0" cy="0"/>
+        </a:xfrm>
+      </p:grpSpPr>
+      <p:sp>
+        <p:nvSpPr>
+          <p:cNvPr id="2" name="1 Başlık"/>
+          <p:cNvSpPr>
+            <a:spLocks noGrp="1"/>
+          </p:cNvSpPr>
+          <p:nvPr>
+            <p:ph type="title"/>
+          </p:nvPr>
+        </p:nvSpPr>
+        <p:spPr/>
+        <p:txBody>
+          <a:bodyPr>
+            <a:normAutofit fontScale="90000"/>
+          </a:bodyPr>
+          <a:lstStyle/>
+          <a:p>
+            <a:r>
+              <a:rPr lang="en-US" dirty="0" smtClean="0"/>
+              <a:t>Automatic code generation</a:t>
+            </a:r>
+            <a:r>
+              <a:rPr lang="tr-TR" dirty="0" smtClean="0"/>
+              <a:t/>
+            </a:r>
+            <a:br>
+              <a:rPr lang="tr-TR" dirty="0" smtClean="0"/>
+            </a:br>
+            <a:r>
+              <a:rPr lang="en-US" dirty="0" smtClean="0"/>
+              <a:t>with systematic approach</a:t>
+            </a:r>
+            <a:endParaRPr lang="en-US" dirty="0"/>
+          </a:p>
+        </p:txBody>
+      </p:sp>
+      <p:pic>
+        <p:nvPicPr>
+          <p:cNvPr id="4" name="Picture 2"/>
+          <p:cNvPicPr>
+            <a:picLocks noGrp="1" noChangeAspect="1" noChangeArrowheads="1"/>
+          </p:cNvPicPr>
+          <p:nvPr>
+            <p:ph idx="1"/>
+          </p:nvPr>
+        </p:nvPicPr>
+        <p:blipFill>
+          <a:blip r:embed="rId2" cstate="print"/>
+          <a:srcRect/>
+          <a:stretch>
+            <a:fillRect/>
+          </a:stretch>
+        </p:blipFill>
+        <p:spPr bwMode="auto">
+          <a:xfrm>
+            <a:off x="307991" y="1700808"/>
+            <a:ext cx="8584489" cy="2493472"/>
+          </a:xfrm>
+          <a:prstGeom prst="rect">
+            <a:avLst/>
+          </a:prstGeom>
+          <a:noFill/>
+          <a:ln w="9525">
+            <a:noFill/>
+            <a:miter lim="800000"/>
+            <a:headEnd/>
+            <a:tailEnd/>
+          </a:ln>
+        </p:spPr>
+      </p:pic>
+      <p:sp>
+        <p:nvSpPr>
+          <p:cNvPr id="5" name="1 Başlık"/>
+          <p:cNvSpPr txBox="1">
+            <a:spLocks/>
+          </p:cNvSpPr>
+          <p:nvPr/>
+        </p:nvSpPr>
+        <p:spPr>
+          <a:xfrm>
+            <a:off x="539552" y="5085184"/>
+            <a:ext cx="8229600" cy="1143000"/>
+          </a:xfrm>
+          <a:prstGeom prst="rect">
+            <a:avLst/>
+          </a:prstGeom>
+        </p:spPr>
+        <p:txBody>
+          <a:bodyPr vert="horz" lIns="91440" tIns="45720" rIns="91440" bIns="45720" rtlCol="0" anchor="ctr">
+            <a:normAutofit fontScale="97500"/>
+          </a:bodyPr>
+          <a:lstStyle/>
+          <a:p>
+            <a:pPr lvl="0" algn="ctr">
+              <a:spcBef>
+                <a:spcPct val="0"/>
+              </a:spcBef>
+            </a:pPr>
+            <a:r>
+              <a:rPr lang="en-US" sz="4400" dirty="0" smtClean="0">
+                <a:latin typeface="+mj-lt"/>
+                <a:ea typeface="+mj-ea"/>
+                <a:cs typeface="+mj-cs"/>
+              </a:rPr>
+              <a:t>performance enhancing additions</a:t>
+            </a:r>
+            <a:endParaRPr kumimoji="0" lang="en-US" sz="4400" b="0" i="0" u="none" strike="noStrike" kern="1200" cap="none" spc="0" normalizeH="0" baseline="0" noProof="0" dirty="0">
+              <a:ln>
+                <a:noFill/>
+              </a:ln>
+              <a:solidFill>
+                <a:schemeClr val="tx1"/>
+              </a:solidFill>
+              <a:effectLst/>
+              <a:uLnTx/>
+              <a:uFillTx/>
+              <a:latin typeface="+mj-lt"/>
+              <a:ea typeface="+mj-ea"/>
+              <a:cs typeface="+mj-cs"/>
+            </a:endParaRPr>
+          </a:p>
+        </p:txBody>
+      </p:sp>
+      <p:sp>
+        <p:nvSpPr>
+          <p:cNvPr id="6" name="5 Aşağı Ok"/>
+          <p:cNvSpPr/>
+          <p:nvPr/>
+        </p:nvSpPr>
+        <p:spPr>
+          <a:xfrm>
+            <a:off x="3995936" y="6093296"/>
+            <a:ext cx="1008112" cy="648072"/>
+          </a:xfrm>
+          <a:prstGeom prst="downArrow">
+            <a:avLst/>
+          </a:prstGeom>
+        </p:spPr>
+        <p:style>
+          <a:lnRef idx="2">
+            <a:schemeClr val="accent1">
+              <a:shade val="50000"/>
+            </a:schemeClr>
+          </a:lnRef>
+          <a:fillRef idx="1">
+            <a:schemeClr val="accent1"/>
+          </a:fillRef>
+          <a:effectRef idx="0">
+            <a:schemeClr val="accent1"/>
+          </a:effectRef>
+          <a:fontRef idx="minor">
+            <a:schemeClr val="lt1"/>
+          </a:fontRef>
+        </p:style>
+        <p:txBody>
+          <a:bodyPr rtlCol="0" anchor="ctr"/>
+          <a:lstStyle/>
+          <a:p>
+            <a:pPr algn="ctr"/>
+            <a:endParaRPr lang="en-US"/>
+          </a:p>
+        </p:txBody>
+      </p:sp>
+    </p:spTree>
+  </p:cSld>
+  <p:clrMapOvr>
+    <a:masterClrMapping/>
+  </p:clrMapOvr>
+</p:sld>
+</file>
+
+<file path=ppt/slides/slide8.xml><?xml version="1.0" encoding="utf-8"?>
+<p:sld xmlns:a="http://schemas.openxmlformats.org/drawingml/2006/main" xmlns:r="http://schemas.openxmlformats.org/officeDocument/2006/relationships" xmlns:p="http://schemas.openxmlformats.org/presentationml/2006/main">
+  <p:cSld>
+    <p:spTree>
+      <p:nvGrpSpPr>
+        <p:cNvPr id="1" name=""/>
+        <p:cNvGrpSpPr/>
+        <p:nvPr/>
+      </p:nvGrpSpPr>
+      <p:grpSpPr>
+        <a:xfrm>
+          <a:off x="0" y="0"/>
+          <a:ext cx="0" cy="0"/>
+          <a:chOff x="0" y="0"/>
+          <a:chExt cx="0" cy="0"/>
+        </a:xfrm>
+      </p:grpSpPr>
+      <p:pic>
+        <p:nvPicPr>
+          <p:cNvPr id="10" name="Picture 2"/>
+          <p:cNvPicPr>
+            <a:picLocks noChangeAspect="1" noChangeArrowheads="1"/>
+          </p:cNvPicPr>
+          <p:nvPr/>
+        </p:nvPicPr>
+        <p:blipFill>
+          <a:blip r:embed="rId2" cstate="print"/>
+          <a:srcRect/>
+          <a:stretch>
+            <a:fillRect/>
+          </a:stretch>
+        </p:blipFill>
+        <p:spPr bwMode="auto">
+          <a:xfrm>
+            <a:off x="2699792" y="0"/>
+            <a:ext cx="6192688" cy="1798743"/>
+          </a:xfrm>
+          <a:prstGeom prst="rect">
+            <a:avLst/>
+          </a:prstGeom>
+          <a:noFill/>
+          <a:ln w="9525">
+            <a:noFill/>
+            <a:miter lim="800000"/>
+            <a:headEnd/>
+            <a:tailEnd/>
+          </a:ln>
+        </p:spPr>
+      </p:pic>
+      <p:pic>
+        <p:nvPicPr>
+          <p:cNvPr id="3075" name="Picture 3"/>
+          <p:cNvPicPr>
+            <a:picLocks noChangeAspect="1" noChangeArrowheads="1"/>
+          </p:cNvPicPr>
+          <p:nvPr/>
+        </p:nvPicPr>
+        <p:blipFill>
+          <a:blip r:embed="rId3" cstate="print"/>
+          <a:srcRect/>
+          <a:stretch>
+            <a:fillRect/>
+          </a:stretch>
+        </p:blipFill>
+        <p:spPr bwMode="auto">
+          <a:xfrm>
+            <a:off x="539552" y="2060848"/>
+            <a:ext cx="8100392" cy="4775856"/>
+          </a:xfrm>
+          <a:prstGeom prst="rect">
+            <a:avLst/>
+          </a:prstGeom>
+          <a:noFill/>
+          <a:ln w="9525">
+            <a:solidFill>
+              <a:schemeClr val="accent1"/>
+            </a:solidFill>
+            <a:miter lim="800000"/>
+            <a:headEnd/>
+            <a:tailEnd/>
+          </a:ln>
+        </p:spPr>
+      </p:pic>
+      <p:cxnSp>
+        <p:nvCxnSpPr>
+          <p:cNvPr id="13" name="12 Düz Ok Bağlayıcısı"/>
+          <p:cNvCxnSpPr/>
+          <p:nvPr/>
+        </p:nvCxnSpPr>
+        <p:spPr>
+          <a:xfrm>
+            <a:off x="6372200" y="1196752"/>
+            <a:ext cx="0" cy="864096"/>
+          </a:xfrm>
+          <a:prstGeom prst="straightConnector1">
+            <a:avLst/>
+          </a:prstGeom>
+          <a:ln>
+            <a:tailEnd type="arrow"/>
+          </a:ln>
+        </p:spPr>
+        <p:style>
+          <a:lnRef idx="1">
+            <a:schemeClr val="accent1"/>
+          </a:lnRef>
+          <a:fillRef idx="0">
+            <a:schemeClr val="accent1"/>
+          </a:fillRef>
+          <a:effectRef idx="0">
+            <a:schemeClr val="accent1"/>
+          </a:effectRef>
+          <a:fontRef idx="minor">
+            <a:schemeClr val="tx1"/>
+          </a:fontRef>
+        </p:style>
+      </p:cxnSp>
+      <p:cxnSp>
+        <p:nvCxnSpPr>
+          <p:cNvPr id="17" name="16 Düz Ok Bağlayıcısı"/>
+          <p:cNvCxnSpPr/>
+          <p:nvPr/>
+        </p:nvCxnSpPr>
+        <p:spPr>
+          <a:xfrm flipH="1">
+            <a:off x="3275856" y="4077072"/>
+            <a:ext cx="790699" cy="864096"/>
+          </a:xfrm>
+          <a:prstGeom prst="straightConnector1">
+            <a:avLst/>
+          </a:prstGeom>
+          <a:ln>
+            <a:tailEnd type="arrow"/>
+          </a:ln>
+        </p:spPr>
+        <p:style>
+          <a:lnRef idx="1">
+            <a:schemeClr val="accent1"/>
+          </a:lnRef>
+          <a:fillRef idx="0">
+            <a:schemeClr val="accent1"/>
+          </a:fillRef>
+          <a:effectRef idx="0">
+            <a:schemeClr val="accent1"/>
+          </a:effectRef>
+          <a:fontRef idx="minor">
+            <a:schemeClr val="tx1"/>
+          </a:fontRef>
+        </p:style>
+      </p:cxnSp>
+      <p:pic>
+        <p:nvPicPr>
+          <p:cNvPr id="4098" name="Picture 2"/>
+          <p:cNvPicPr>
+            <a:picLocks noChangeAspect="1" noChangeArrowheads="1"/>
+          </p:cNvPicPr>
+          <p:nvPr/>
+        </p:nvPicPr>
+        <p:blipFill>
+          <a:blip r:embed="rId4" cstate="print"/>
+          <a:srcRect/>
+          <a:stretch>
+            <a:fillRect/>
+          </a:stretch>
+        </p:blipFill>
+        <p:spPr bwMode="auto">
+          <a:xfrm>
+            <a:off x="323528" y="4930130"/>
+            <a:ext cx="2968088" cy="1927870"/>
+          </a:xfrm>
+          <a:prstGeom prst="rect">
+            <a:avLst/>
+          </a:prstGeom>
+          <a:noFill/>
+          <a:ln w="9525">
+            <a:noFill/>
+            <a:miter lim="800000"/>
+            <a:headEnd/>
+            <a:tailEnd/>
+          </a:ln>
+        </p:spPr>
+      </p:pic>
+      <p:sp>
+        <p:nvSpPr>
+          <p:cNvPr id="8" name="7 Metin kutusu"/>
+          <p:cNvSpPr txBox="1"/>
+          <p:nvPr/>
+        </p:nvSpPr>
+        <p:spPr>
+          <a:xfrm>
+            <a:off x="323528" y="260648"/>
+            <a:ext cx="1641799" cy="646331"/>
+          </a:xfrm>
+          <a:prstGeom prst="rect">
+            <a:avLst/>
+          </a:prstGeom>
+          <a:noFill/>
+        </p:spPr>
+        <p:txBody>
+          <a:bodyPr wrap="square" rtlCol="0">
+            <a:spAutoFit/>
+          </a:bodyPr>
+          <a:lstStyle/>
+          <a:p>
+            <a:r>
+              <a:rPr lang="en-US" dirty="0" smtClean="0"/>
+              <a:t>IIR Filter </a:t>
+            </a:r>
+          </a:p>
+          <a:p>
+            <a:r>
+              <a:rPr lang="en-US" dirty="0" smtClean="0"/>
+              <a:t>for speed ref.</a:t>
+            </a:r>
+            <a:endParaRPr lang="en-US" dirty="0"/>
+          </a:p>
+        </p:txBody>
+      </p:sp>
+    </p:spTree>
+  </p:cSld>
+  <p:clrMapOvr>
+    <a:masterClrMapping/>
+  </p:clrMapOvr>
+</p:sld>
+</file>
+
+<file path=ppt/slides/slide9.xml><?xml version="1.0" encoding="utf-8"?>
+<p:sld xmlns:a="http://schemas.openxmlformats.org/drawingml/2006/main" xmlns:r="http://schemas.openxmlformats.org/officeDocument/2006/relationships" xmlns:p="http://schemas.openxmlformats.org/presentationml/2006/main">
+  <p:cSld>
+    <p:spTree>
+      <p:nvGrpSpPr>
+        <p:cNvPr id="1" name=""/>
+        <p:cNvGrpSpPr/>
+        <p:nvPr/>
+      </p:nvGrpSpPr>
+      <p:grpSpPr>
+        <a:xfrm>
+          <a:off x="0" y="0"/>
+          <a:ext cx="0" cy="0"/>
+          <a:chOff x="0" y="0"/>
+          <a:chExt cx="0" cy="0"/>
+        </a:xfrm>
+      </p:grpSpPr>
+      <p:pic>
+        <p:nvPicPr>
+          <p:cNvPr id="1026" name="Picture 2"/>
+          <p:cNvPicPr>
+            <a:picLocks noGrp="1" noChangeAspect="1" noChangeArrowheads="1"/>
+          </p:cNvPicPr>
+          <p:nvPr>
+            <p:ph idx="1"/>
+          </p:nvPr>
+        </p:nvPicPr>
+        <p:blipFill>
+          <a:blip r:embed="rId2" cstate="print"/>
+          <a:srcRect/>
+          <a:stretch>
+            <a:fillRect/>
+          </a:stretch>
+        </p:blipFill>
+        <p:spPr bwMode="auto">
+          <a:xfrm>
+            <a:off x="107504" y="2726041"/>
+            <a:ext cx="8931177" cy="3655287"/>
+          </a:xfrm>
+          <a:prstGeom prst="rect">
+            <a:avLst/>
+          </a:prstGeom>
+          <a:noFill/>
+          <a:ln w="9525">
+            <a:noFill/>
+            <a:miter lim="800000"/>
+            <a:headEnd/>
+            <a:tailEnd/>
+          </a:ln>
+        </p:spPr>
+      </p:pic>
+      <p:pic>
+        <p:nvPicPr>
+          <p:cNvPr id="5" name="Picture 2"/>
+          <p:cNvPicPr>
+            <a:picLocks noChangeAspect="1" noChangeArrowheads="1"/>
+          </p:cNvPicPr>
+          <p:nvPr/>
+        </p:nvPicPr>
+        <p:blipFill>
+          <a:blip r:embed="rId3" cstate="print"/>
+          <a:srcRect/>
+          <a:stretch>
+            <a:fillRect/>
+          </a:stretch>
+        </p:blipFill>
+        <p:spPr bwMode="auto">
+          <a:xfrm>
+            <a:off x="2699792" y="116632"/>
+            <a:ext cx="4269418" cy="1728192"/>
+          </a:xfrm>
+          <a:prstGeom prst="rect">
+            <a:avLst/>
+          </a:prstGeom>
+          <a:noFill/>
+          <a:ln w="9525">
+            <a:solidFill>
+              <a:schemeClr val="accent1"/>
+            </a:solidFill>
+            <a:miter lim="800000"/>
+            <a:headEnd/>
+            <a:tailEnd/>
+          </a:ln>
+        </p:spPr>
+      </p:pic>
+      <p:cxnSp>
+        <p:nvCxnSpPr>
+          <p:cNvPr id="7" name="6 Düz Ok Bağlayıcısı"/>
+          <p:cNvCxnSpPr/>
+          <p:nvPr/>
+        </p:nvCxnSpPr>
+        <p:spPr>
+          <a:xfrm>
+            <a:off x="4860032" y="1340768"/>
+            <a:ext cx="72008" cy="1296144"/>
+          </a:xfrm>
+          <a:prstGeom prst="straightConnector1">
+            <a:avLst/>
+          </a:prstGeom>
+          <a:ln>
+            <a:tailEnd type="arrow"/>
+          </a:ln>
+        </p:spPr>
+        <p:style>
+          <a:lnRef idx="1">
+            <a:schemeClr val="accent1"/>
+          </a:lnRef>
+          <a:fillRef idx="0">
+            <a:schemeClr val="accent1"/>
+          </a:fillRef>
+          <a:effectRef idx="0">
+            <a:schemeClr val="accent1"/>
+          </a:effectRef>
+          <a:fontRef idx="minor">
+            <a:schemeClr val="tx1"/>
+          </a:fontRef>
+        </p:style>
+      </p:cxnSp>
+      <p:sp>
+        <p:nvSpPr>
+          <p:cNvPr id="6" name="5 Metin kutusu"/>
+          <p:cNvSpPr txBox="1"/>
+          <p:nvPr/>
+        </p:nvSpPr>
+        <p:spPr>
+          <a:xfrm>
+            <a:off x="323528" y="260648"/>
+            <a:ext cx="1641799" cy="1477328"/>
+          </a:xfrm>
+          <a:prstGeom prst="rect">
+            <a:avLst/>
+          </a:prstGeom>
+          <a:noFill/>
+        </p:spPr>
+        <p:txBody>
+          <a:bodyPr wrap="square" rtlCol="0">
+            <a:spAutoFit/>
+          </a:bodyPr>
+          <a:lstStyle/>
+          <a:p>
+            <a:r>
+              <a:rPr lang="en-US" dirty="0" smtClean="0"/>
+              <a:t>Feed Forward</a:t>
+            </a:r>
+          </a:p>
+          <a:p>
+            <a:r>
+              <a:rPr lang="en-US" dirty="0" smtClean="0"/>
+              <a:t>Decoupling</a:t>
+            </a:r>
+          </a:p>
+          <a:p>
+            <a:r>
+              <a:rPr lang="en-US" dirty="0" smtClean="0"/>
+              <a:t>for</a:t>
+            </a:r>
+          </a:p>
+          <a:p>
+            <a:r>
+              <a:rPr lang="en-US" dirty="0" smtClean="0"/>
+              <a:t>Current Controller</a:t>
+            </a:r>
+            <a:endParaRPr lang="en-US" dirty="0"/>
           </a:p>
         </p:txBody>
       </p:sp>

</xml_diff>